<commit_message>
Fixed contract bug and updated presentation.
</commit_message>
<xml_diff>
--- a/presentation/Direct-Debit-smart-contract.pptx
+++ b/presentation/Direct-Debit-smart-contract.pptx
@@ -205,7 +205,7 @@
           <a:p>
             <a:fld id="{9CA67EDA-09AB-4309-ACD0-C52D03FBEE3A}" type="datetimeFigureOut">
               <a:rPr lang="en-US" smtClean="0"/>
-              <a:t>9/8/2016</a:t>
+              <a:t>9/9/2016</a:t>
             </a:fld>
             <a:endParaRPr lang="en-US"/>
           </a:p>
@@ -9265,7 +9265,7 @@
           <a:p>
             <a:fld id="{A2BB7061-98EF-4456-B5C6-78771AD0AC13}" type="datetime1">
               <a:rPr lang="en-US" smtClean="0"/>
-              <a:t>9/8/2016</a:t>
+              <a:t>9/9/2016</a:t>
             </a:fld>
             <a:endParaRPr lang="en-US"/>
           </a:p>
@@ -9475,7 +9475,7 @@
           <a:p>
             <a:fld id="{7574743F-39C3-4BD8-B546-DC3E5DCFD31F}" type="datetime1">
               <a:rPr lang="en-US" smtClean="0"/>
-              <a:t>9/8/2016</a:t>
+              <a:t>9/9/2016</a:t>
             </a:fld>
             <a:endParaRPr lang="en-US"/>
           </a:p>
@@ -9658,7 +9658,7 @@
           <a:p>
             <a:fld id="{47417E39-82F4-40EB-835A-9B17E945301B}" type="datetime1">
               <a:rPr lang="en-US" smtClean="0"/>
-              <a:t>9/8/2016</a:t>
+              <a:t>9/9/2016</a:t>
             </a:fld>
             <a:endParaRPr lang="en-US"/>
           </a:p>
@@ -9866,7 +9866,7 @@
           <a:p>
             <a:fld id="{123599D5-33C4-4BCC-BC8A-D637D57F6632}" type="datetime1">
               <a:rPr lang="en-US" smtClean="0"/>
-              <a:t>9/8/2016</a:t>
+              <a:t>9/9/2016</a:t>
             </a:fld>
             <a:endParaRPr lang="en-US"/>
           </a:p>
@@ -18767,7 +18767,7 @@
           <a:p>
             <a:fld id="{6FF17CFD-B0DB-41AE-9C94-9A28DDABB0F6}" type="datetime1">
               <a:rPr lang="en-US" smtClean="0"/>
-              <a:t>9/8/2016</a:t>
+              <a:t>9/9/2016</a:t>
             </a:fld>
             <a:endParaRPr lang="en-US"/>
           </a:p>
@@ -19044,7 +19044,7 @@
           <a:p>
             <a:fld id="{8E75DDB5-B71D-48D6-A3D8-957BCEB36642}" type="datetime1">
               <a:rPr lang="en-US" smtClean="0"/>
-              <a:t>9/8/2016</a:t>
+              <a:t>9/9/2016</a:t>
             </a:fld>
             <a:endParaRPr lang="en-US"/>
           </a:p>
@@ -19445,7 +19445,7 @@
           <a:p>
             <a:fld id="{2A88ED04-AA30-45CF-B84C-B001A32FFD89}" type="datetime1">
               <a:rPr lang="en-US" smtClean="0"/>
-              <a:t>9/8/2016</a:t>
+              <a:t>9/9/2016</a:t>
             </a:fld>
             <a:endParaRPr lang="en-US"/>
           </a:p>
@@ -19566,7 +19566,7 @@
           <a:p>
             <a:fld id="{E1054F53-3411-4E67-9F07-C88A4B2CE693}" type="datetime1">
               <a:rPr lang="en-US" smtClean="0"/>
-              <a:t>9/8/2016</a:t>
+              <a:t>9/9/2016</a:t>
             </a:fld>
             <a:endParaRPr lang="en-US"/>
           </a:p>
@@ -19664,7 +19664,7 @@
           <a:p>
             <a:fld id="{B83EEC18-05A7-4D0A-B844-5C778F7B880E}" type="datetime1">
               <a:rPr lang="en-US" smtClean="0"/>
-              <a:t>9/8/2016</a:t>
+              <a:t>9/9/2016</a:t>
             </a:fld>
             <a:endParaRPr lang="en-US"/>
           </a:p>
@@ -19957,7 +19957,7 @@
           <a:p>
             <a:fld id="{8508B92D-AB96-467E-8B79-7CA476FF8B2B}" type="datetime1">
               <a:rPr lang="en-US" smtClean="0"/>
-              <a:t>9/8/2016</a:t>
+              <a:t>9/9/2016</a:t>
             </a:fld>
             <a:endParaRPr lang="en-US"/>
           </a:p>
@@ -20240,7 +20240,7 @@
           <a:p>
             <a:fld id="{2092D5DE-8C56-4440-B341-EFF08CAF5712}" type="datetime1">
               <a:rPr lang="en-US" smtClean="0"/>
-              <a:t>9/8/2016</a:t>
+              <a:t>9/9/2016</a:t>
             </a:fld>
             <a:endParaRPr lang="en-US"/>
           </a:p>
@@ -20493,7 +20493,7 @@
           <a:p>
             <a:fld id="{EC21D860-E91E-46D4-B2B7-BB5C3A9643BD}" type="datetime1">
               <a:rPr lang="en-US" smtClean="0"/>
-              <a:t>9/8/2016</a:t>
+              <a:t>9/9/2016</a:t>
             </a:fld>
             <a:endParaRPr lang="en-US"/>
           </a:p>
@@ -23510,12 +23510,22 @@
             <a:pPr lvl="0" algn="ctr"/>
             <a:r>
               <a:rPr lang="en-US" sz="2000" dirty="0"/>
-              <a:t>Choose Fix or Variable payment</a:t>
+              <a:t>Direct Debit</a:t>
             </a:r>
           </a:p>
           <a:p>
             <a:pPr lvl="0" algn="ctr"/>
-            <a:endParaRPr lang="en-US" sz="2000" dirty="0"/>
+            <a:r>
+              <a:rPr lang="en-US" sz="2000" dirty="0"/>
+              <a:t>Or</a:t>
+            </a:r>
+          </a:p>
+          <a:p>
+            <a:pPr lvl="0" algn="ctr"/>
+            <a:r>
+              <a:rPr lang="en-US" sz="2000" dirty="0"/>
+              <a:t>Standing Order</a:t>
+            </a:r>
           </a:p>
         </p:txBody>
       </p:sp>
@@ -23696,7 +23706,7 @@
             <a:pPr lvl="0" algn="ctr"/>
             <a:r>
               <a:rPr lang="en-US" sz="2400" dirty="0"/>
-              <a:t>If Variable payment</a:t>
+              <a:t>If direct debit</a:t>
             </a:r>
           </a:p>
         </p:txBody>
@@ -24373,9 +24383,58 @@
         </p:nvSpPr>
         <p:spPr/>
         <p:txBody>
-          <a:bodyPr/>
+          <a:bodyPr>
+            <a:normAutofit/>
+          </a:bodyPr>
           <a:lstStyle/>
           <a:p>
+            <a:pPr marL="274638" indent="-274638">
+              <a:buFont typeface="Wingdings" panose="05000000000000000000" pitchFamily="2" charset="2"/>
+              <a:buChar char="Ø"/>
+            </a:pPr>
+            <a:r>
+              <a:rPr lang="en-US" dirty="0"/>
+              <a:t>Contracts cannot initiate the execution of code</a:t>
+            </a:r>
+          </a:p>
+          <a:p>
+            <a:pPr marL="274638" indent="-274638">
+              <a:buFont typeface="Wingdings" panose="05000000000000000000" pitchFamily="2" charset="2"/>
+              <a:buChar char="Ø"/>
+            </a:pPr>
+            <a:r>
+              <a:rPr lang="en-US" dirty="0"/>
+              <a:t>Private Key based account needs to trigger the transaction</a:t>
+            </a:r>
+          </a:p>
+          <a:p>
+            <a:pPr marL="274638" indent="-274638">
+              <a:buFont typeface="Wingdings" panose="05000000000000000000" pitchFamily="2" charset="2"/>
+              <a:buChar char="Ø"/>
+            </a:pPr>
+            <a:r>
+              <a:rPr lang="en-US" dirty="0" err="1"/>
+              <a:t>Ethereum</a:t>
+            </a:r>
+            <a:r>
+              <a:rPr lang="en-US" dirty="0"/>
+              <a:t> Alarm Clock</a:t>
+            </a:r>
+          </a:p>
+          <a:p>
+            <a:pPr marL="274638" indent="-274638">
+              <a:buFont typeface="Wingdings" panose="05000000000000000000" pitchFamily="2" charset="2"/>
+              <a:buChar char="Ø"/>
+            </a:pPr>
+            <a:r>
+              <a:rPr lang="en-US" dirty="0"/>
+              <a:t>A reward in exchange for initiating the transaction.</a:t>
+            </a:r>
+          </a:p>
+          <a:p>
+            <a:pPr marL="0" indent="0">
+              <a:buNone/>
+            </a:pPr>
             <a:endParaRPr lang="en-US" dirty="0"/>
           </a:p>
         </p:txBody>

</xml_diff>